<commit_message>
attention is all you need，Positional Encoding 完成
</commit_message>
<xml_diff>
--- a/attention-is-all-you-need/math.pptx
+++ b/attention-is-all-you-need/math.pptx
@@ -8,6 +8,8 @@
     <p:sldId id="256" r:id="rId2"/>
     <p:sldId id="257" r:id="rId3"/>
     <p:sldId id="258" r:id="rId4"/>
+    <p:sldId id="260" r:id="rId5"/>
+    <p:sldId id="259" r:id="rId6"/>
   </p:sldIdLst>
   <p:sldSz cx="21599525" cy="6858000"/>
   <p:notesSz cx="6858000" cy="9144000"/>
@@ -3754,8 +3756,8 @@
           <a:chExt cx="0" cy="0"/>
         </a:xfrm>
       </p:grpSpPr>
-      <mc:AlternateContent xmlns:mc="http://schemas.openxmlformats.org/markup-compatibility/2006">
-        <mc:Choice xmlns:a14="http://schemas.microsoft.com/office/drawing/2010/main" Requires="a14">
+      <mc:AlternateContent xmlns:mc="http://schemas.openxmlformats.org/markup-compatibility/2006" xmlns:a14="http://schemas.microsoft.com/office/drawing/2010/main">
+        <mc:Choice Requires="a14">
           <p:sp>
             <p:nvSpPr>
               <p:cNvPr id="4" name="文字方塊 3"/>
@@ -3778,6 +3780,7 @@
               </a:bodyPr>
               <a:lstStyle/>
               <a:p>
+                <a:pPr/>
                 <a14:m>
                   <m:oMathPara xmlns:m="http://schemas.openxmlformats.org/officeDocument/2006/math">
                     <m:oMathParaPr>
@@ -4454,6 +4457,7 @@
                 </a:r>
               </a:p>
               <a:p>
+                <a:pPr/>
                 <a14:m>
                   <m:oMathPara xmlns:m="http://schemas.openxmlformats.org/officeDocument/2006/math">
                     <m:oMathParaPr>
@@ -4818,7 +4822,7 @@
             </p:txBody>
           </p:sp>
         </mc:Choice>
-        <mc:Fallback>
+        <mc:Fallback xmlns="">
           <p:sp>
             <p:nvSpPr>
               <p:cNvPr id="4" name="文字方塊 3"/>
@@ -4861,6 +4865,820 @@
     <p:extLst>
       <p:ext uri="{BB962C8B-B14F-4D97-AF65-F5344CB8AC3E}">
         <p14:creationId xmlns:p14="http://schemas.microsoft.com/office/powerpoint/2010/main" val="2128163780"/>
+      </p:ext>
+    </p:extLst>
+  </p:cSld>
+  <p:clrMapOvr>
+    <a:masterClrMapping/>
+  </p:clrMapOvr>
+  <p:timing>
+    <p:tnLst>
+      <p:par>
+        <p:cTn id="1" dur="indefinite" restart="never" nodeType="tmRoot"/>
+      </p:par>
+    </p:tnLst>
+  </p:timing>
+</p:sld>
+</file>
+
+<file path=ppt/slides/slide4.xml><?xml version="1.0" encoding="utf-8"?>
+<p:sld xmlns:a="http://schemas.openxmlformats.org/drawingml/2006/main" xmlns:r="http://schemas.openxmlformats.org/officeDocument/2006/relationships" xmlns:p="http://schemas.openxmlformats.org/presentationml/2006/main">
+  <p:cSld>
+    <p:bg>
+      <p:bgPr>
+        <a:solidFill>
+          <a:srgbClr val="282828"/>
+        </a:solidFill>
+        <a:effectLst/>
+      </p:bgPr>
+    </p:bg>
+    <p:spTree>
+      <p:nvGrpSpPr>
+        <p:cNvPr id="1" name=""/>
+        <p:cNvGrpSpPr/>
+        <p:nvPr/>
+      </p:nvGrpSpPr>
+      <p:grpSpPr>
+        <a:xfrm>
+          <a:off x="0" y="0"/>
+          <a:ext cx="0" cy="0"/>
+          <a:chOff x="0" y="0"/>
+          <a:chExt cx="0" cy="0"/>
+        </a:xfrm>
+      </p:grpSpPr>
+      <mc:AlternateContent xmlns:mc="http://schemas.openxmlformats.org/markup-compatibility/2006">
+        <mc:Choice xmlns:a14="http://schemas.microsoft.com/office/drawing/2010/main" Requires="a14">
+          <p:sp>
+            <p:nvSpPr>
+              <p:cNvPr id="7" name="文字方塊 6"/>
+              <p:cNvSpPr txBox="1"/>
+              <p:nvPr/>
+            </p:nvSpPr>
+            <p:spPr>
+              <a:xfrm>
+                <a:off x="2812471" y="2263335"/>
+                <a:ext cx="14256328" cy="923458"/>
+              </a:xfrm>
+              <a:prstGeom prst="rect">
+                <a:avLst/>
+              </a:prstGeom>
+              <a:noFill/>
+            </p:spPr>
+            <p:txBody>
+              <a:bodyPr wrap="square" lIns="0" tIns="0" rIns="0" bIns="0" rtlCol="0">
+                <a:spAutoFit/>
+              </a:bodyPr>
+              <a:lstStyle/>
+              <a:p>
+                <a:pPr/>
+                <a14:m>
+                  <m:oMathPara xmlns:m="http://schemas.openxmlformats.org/officeDocument/2006/math">
+                    <m:oMathParaPr>
+                      <m:jc m:val="centerGroup"/>
+                    </m:oMathParaPr>
+                    <m:oMath xmlns:m="http://schemas.openxmlformats.org/officeDocument/2006/math">
+                      <m:r>
+                        <a:rPr lang="en-US" altLang="zh-TW" sz="6001" b="0" i="1" smtClean="0">
+                          <a:solidFill>
+                            <a:srgbClr val="FBF1C7"/>
+                          </a:solidFill>
+                          <a:latin typeface="Cambria Math" panose="02040503050406030204" pitchFamily="18" charset="0"/>
+                        </a:rPr>
+                        <m:t>𝑃𝑜𝑠𝑖𝑡𝑖𝑜𝑛𝑎𝑙𝐸𝑛𝑐𝑜𝑑𝑖𝑛𝑔</m:t>
+                      </m:r>
+                      <m:r>
+                        <a:rPr lang="en-US" altLang="zh-TW" sz="6001" b="0" i="1" smtClean="0">
+                          <a:solidFill>
+                            <a:srgbClr val="FBF1C7"/>
+                          </a:solidFill>
+                          <a:latin typeface="Cambria Math" panose="02040503050406030204" pitchFamily="18" charset="0"/>
+                        </a:rPr>
+                        <m:t>(</m:t>
+                      </m:r>
+                      <m:r>
+                        <a:rPr lang="en-US" altLang="zh-TW" sz="6001" b="0" i="1" smtClean="0">
+                          <a:solidFill>
+                            <a:srgbClr val="FBF1C7"/>
+                          </a:solidFill>
+                          <a:latin typeface="Cambria Math" panose="02040503050406030204" pitchFamily="18" charset="0"/>
+                        </a:rPr>
+                        <m:t>𝐼𝑛𝑝𝑢𝑡</m:t>
+                      </m:r>
+                      <m:r>
+                        <a:rPr lang="en-US" altLang="zh-TW" sz="6001" b="0" i="1" smtClean="0">
+                          <a:solidFill>
+                            <a:srgbClr val="FBF1C7"/>
+                          </a:solidFill>
+                          <a:latin typeface="Cambria Math" panose="02040503050406030204" pitchFamily="18" charset="0"/>
+                        </a:rPr>
+                        <m:t>)=</m:t>
+                      </m:r>
+                      <m:r>
+                        <a:rPr lang="en-US" altLang="zh-TW" sz="6001" i="1">
+                          <a:solidFill>
+                            <a:srgbClr val="FBF1C7"/>
+                          </a:solidFill>
+                          <a:latin typeface="Cambria Math" panose="02040503050406030204" pitchFamily="18" charset="0"/>
+                        </a:rPr>
+                        <m:t>𝐼𝑛𝑝𝑢𝑡</m:t>
+                      </m:r>
+                      <m:r>
+                        <a:rPr lang="en-US" altLang="zh-TW" sz="6001" b="0" i="1" smtClean="0">
+                          <a:solidFill>
+                            <a:srgbClr val="FBF1C7"/>
+                          </a:solidFill>
+                          <a:latin typeface="Cambria Math" panose="02040503050406030204" pitchFamily="18" charset="0"/>
+                        </a:rPr>
+                        <m:t>+</m:t>
+                      </m:r>
+                      <m:r>
+                        <a:rPr lang="en-US" altLang="zh-TW" sz="6001" b="0" i="1" smtClean="0">
+                          <a:solidFill>
+                            <a:srgbClr val="FBF1C7"/>
+                          </a:solidFill>
+                          <a:latin typeface="Cambria Math" panose="02040503050406030204" pitchFamily="18" charset="0"/>
+                        </a:rPr>
+                        <m:t>𝑃𝐸</m:t>
+                      </m:r>
+                    </m:oMath>
+                  </m:oMathPara>
+                </a14:m>
+                <a:endParaRPr lang="zh-TW" altLang="en-US" sz="6001" dirty="0">
+                  <a:solidFill>
+                    <a:srgbClr val="FBF1C7"/>
+                  </a:solidFill>
+                </a:endParaRPr>
+              </a:p>
+            </p:txBody>
+          </p:sp>
+        </mc:Choice>
+        <mc:Fallback>
+          <p:sp>
+            <p:nvSpPr>
+              <p:cNvPr id="7" name="文字方塊 6"/>
+              <p:cNvSpPr txBox="1">
+                <a:spLocks noRot="1" noChangeAspect="1" noMove="1" noResize="1" noEditPoints="1" noAdjustHandles="1" noChangeArrowheads="1" noChangeShapeType="1" noTextEdit="1"/>
+              </p:cNvSpPr>
+              <p:nvPr/>
+            </p:nvSpPr>
+            <p:spPr>
+              <a:xfrm>
+                <a:off x="2812471" y="2263335"/>
+                <a:ext cx="14256328" cy="923458"/>
+              </a:xfrm>
+              <a:prstGeom prst="rect">
+                <a:avLst/>
+              </a:prstGeom>
+              <a:blipFill rotWithShape="0">
+                <a:blip r:embed="rId2"/>
+                <a:stretch>
+                  <a:fillRect/>
+                </a:stretch>
+              </a:blipFill>
+            </p:spPr>
+            <p:txBody>
+              <a:bodyPr/>
+              <a:lstStyle/>
+              <a:p>
+                <a:r>
+                  <a:rPr lang="zh-TW" altLang="en-US">
+                    <a:noFill/>
+                  </a:rPr>
+                  <a:t> </a:t>
+                </a:r>
+              </a:p>
+            </p:txBody>
+          </p:sp>
+        </mc:Fallback>
+      </mc:AlternateContent>
+    </p:spTree>
+    <p:extLst>
+      <p:ext uri="{BB962C8B-B14F-4D97-AF65-F5344CB8AC3E}">
+        <p14:creationId xmlns:p14="http://schemas.microsoft.com/office/powerpoint/2010/main" val="2060499892"/>
+      </p:ext>
+    </p:extLst>
+  </p:cSld>
+  <p:clrMapOvr>
+    <a:masterClrMapping/>
+  </p:clrMapOvr>
+  <p:timing>
+    <p:tnLst>
+      <p:par>
+        <p:cTn id="1" dur="indefinite" restart="never" nodeType="tmRoot"/>
+      </p:par>
+    </p:tnLst>
+  </p:timing>
+</p:sld>
+</file>
+
+<file path=ppt/slides/slide5.xml><?xml version="1.0" encoding="utf-8"?>
+<p:sld xmlns:a="http://schemas.openxmlformats.org/drawingml/2006/main" xmlns:r="http://schemas.openxmlformats.org/officeDocument/2006/relationships" xmlns:p="http://schemas.openxmlformats.org/presentationml/2006/main">
+  <p:cSld>
+    <p:bg>
+      <p:bgPr>
+        <a:solidFill>
+          <a:srgbClr val="282828"/>
+        </a:solidFill>
+        <a:effectLst/>
+      </p:bgPr>
+    </p:bg>
+    <p:spTree>
+      <p:nvGrpSpPr>
+        <p:cNvPr id="1" name=""/>
+        <p:cNvGrpSpPr/>
+        <p:nvPr/>
+      </p:nvGrpSpPr>
+      <p:grpSpPr>
+        <a:xfrm>
+          <a:off x="0" y="0"/>
+          <a:ext cx="0" cy="0"/>
+          <a:chOff x="0" y="0"/>
+          <a:chExt cx="0" cy="0"/>
+        </a:xfrm>
+      </p:grpSpPr>
+      <mc:AlternateContent xmlns:mc="http://schemas.openxmlformats.org/markup-compatibility/2006">
+        <mc:Choice xmlns:a14="http://schemas.microsoft.com/office/drawing/2010/main" Requires="a14">
+          <p:sp>
+            <p:nvSpPr>
+              <p:cNvPr id="4" name="文字方塊 3"/>
+              <p:cNvSpPr txBox="1"/>
+              <p:nvPr/>
+            </p:nvSpPr>
+            <p:spPr>
+              <a:xfrm>
+                <a:off x="3948545" y="1259535"/>
+                <a:ext cx="13868400" cy="986809"/>
+              </a:xfrm>
+              <a:prstGeom prst="rect">
+                <a:avLst/>
+              </a:prstGeom>
+              <a:noFill/>
+            </p:spPr>
+            <p:txBody>
+              <a:bodyPr wrap="square" lIns="0" tIns="0" rIns="0" bIns="0" rtlCol="0">
+                <a:spAutoFit/>
+              </a:bodyPr>
+              <a:lstStyle/>
+              <a:p>
+                <a:pPr/>
+                <a14:m>
+                  <m:oMathPara xmlns:m="http://schemas.openxmlformats.org/officeDocument/2006/math">
+                    <m:oMathParaPr>
+                      <m:jc m:val="centerGroup"/>
+                    </m:oMathParaPr>
+                    <m:oMath xmlns:m="http://schemas.openxmlformats.org/officeDocument/2006/math">
+                      <m:r>
+                        <m:rPr>
+                          <m:sty m:val="p"/>
+                        </m:rPr>
+                        <a:rPr lang="en-US" altLang="zh-TW" sz="6001" i="1" smtClean="0">
+                          <a:solidFill>
+                            <a:srgbClr val="FBF1C7"/>
+                          </a:solidFill>
+                          <a:latin typeface="Cambria Math" panose="02040503050406030204" pitchFamily="18" charset="0"/>
+                        </a:rPr>
+                        <m:t>P</m:t>
+                      </m:r>
+                      <m:r>
+                        <m:rPr>
+                          <m:sty m:val="p"/>
+                        </m:rPr>
+                        <a:rPr lang="en-US" altLang="zh-TW" sz="6001" i="1">
+                          <a:solidFill>
+                            <a:srgbClr val="FBF1C7"/>
+                          </a:solidFill>
+                          <a:latin typeface="Cambria Math" panose="02040503050406030204" pitchFamily="18" charset="0"/>
+                        </a:rPr>
+                        <m:t>E</m:t>
+                      </m:r>
+                      <m:r>
+                        <a:rPr lang="en-US" altLang="zh-TW" sz="6001" i="1">
+                          <a:solidFill>
+                            <a:srgbClr val="FBF1C7"/>
+                          </a:solidFill>
+                          <a:latin typeface="Cambria Math" panose="02040503050406030204" pitchFamily="18" charset="0"/>
+                        </a:rPr>
+                        <m:t>[</m:t>
+                      </m:r>
+                      <m:r>
+                        <a:rPr lang="en-US" altLang="zh-TW" sz="6001" b="0" i="1" smtClean="0">
+                          <a:solidFill>
+                            <a:srgbClr val="FBF1C7"/>
+                          </a:solidFill>
+                          <a:latin typeface="Cambria Math" panose="02040503050406030204" pitchFamily="18" charset="0"/>
+                        </a:rPr>
+                        <m:t>𝑝𝑜𝑠</m:t>
+                      </m:r>
+                      <m:r>
+                        <a:rPr lang="en-US" altLang="zh-TW" sz="6001" b="0" i="1" smtClean="0">
+                          <a:solidFill>
+                            <a:srgbClr val="FBF1C7"/>
+                          </a:solidFill>
+                          <a:latin typeface="Cambria Math" panose="02040503050406030204" pitchFamily="18" charset="0"/>
+                        </a:rPr>
+                        <m:t>,2</m:t>
+                      </m:r>
+                      <m:r>
+                        <a:rPr lang="en-US" altLang="zh-TW" sz="6001" b="0" i="1" smtClean="0">
+                          <a:solidFill>
+                            <a:srgbClr val="FBF1C7"/>
+                          </a:solidFill>
+                          <a:latin typeface="Cambria Math" panose="02040503050406030204" pitchFamily="18" charset="0"/>
+                        </a:rPr>
+                        <m:t>𝑖</m:t>
+                      </m:r>
+                      <m:r>
+                        <a:rPr lang="en-US" altLang="zh-TW" sz="6001" i="1">
+                          <a:solidFill>
+                            <a:srgbClr val="FBF1C7"/>
+                          </a:solidFill>
+                          <a:latin typeface="Cambria Math" panose="02040503050406030204" pitchFamily="18" charset="0"/>
+                        </a:rPr>
+                        <m:t>]</m:t>
+                      </m:r>
+                      <m:r>
+                        <a:rPr lang="en-US" altLang="zh-TW" sz="6001" i="1">
+                          <a:solidFill>
+                            <a:srgbClr val="FBF1C7"/>
+                          </a:solidFill>
+                          <a:latin typeface="Cambria Math" panose="02040503050406030204" pitchFamily="18" charset="0"/>
+                        </a:rPr>
+                        <m:t>=</m:t>
+                      </m:r>
+                      <m:r>
+                        <m:rPr>
+                          <m:sty m:val="p"/>
+                        </m:rPr>
+                        <a:rPr lang="en-US" altLang="zh-TW" sz="6001" b="0" i="0" smtClean="0">
+                          <a:solidFill>
+                            <a:srgbClr val="FBF1C7"/>
+                          </a:solidFill>
+                          <a:latin typeface="Cambria Math" panose="02040503050406030204" pitchFamily="18" charset="0"/>
+                        </a:rPr>
+                        <m:t>sin</m:t>
+                      </m:r>
+                      <m:r>
+                        <a:rPr lang="en-US" altLang="zh-TW" sz="6001" b="0" i="1" smtClean="0">
+                          <a:solidFill>
+                            <a:srgbClr val="FBF1C7"/>
+                          </a:solidFill>
+                          <a:latin typeface="Cambria Math" panose="02040503050406030204" pitchFamily="18" charset="0"/>
+                        </a:rPr>
+                        <m:t>⁡(</m:t>
+                      </m:r>
+                      <m:r>
+                        <a:rPr lang="en-US" altLang="zh-TW" sz="6001" b="0" i="1" smtClean="0">
+                          <a:solidFill>
+                            <a:srgbClr val="FBF1C7"/>
+                          </a:solidFill>
+                          <a:latin typeface="Cambria Math" panose="02040503050406030204" pitchFamily="18" charset="0"/>
+                        </a:rPr>
+                        <m:t>𝑝𝑜𝑠</m:t>
+                      </m:r>
+                      <m:r>
+                        <a:rPr lang="en-US" altLang="zh-TW" sz="6001" b="0" i="1" smtClean="0">
+                          <a:solidFill>
+                            <a:srgbClr val="FBF1C7"/>
+                          </a:solidFill>
+                          <a:latin typeface="Cambria Math" panose="02040503050406030204" pitchFamily="18" charset="0"/>
+                        </a:rPr>
+                        <m:t>/</m:t>
+                      </m:r>
+                      <m:sSup>
+                        <m:sSupPr>
+                          <m:ctrlPr>
+                            <a:rPr lang="en-US" altLang="zh-TW" sz="6001" b="0" i="1" smtClean="0">
+                              <a:solidFill>
+                                <a:srgbClr val="FBF1C7"/>
+                              </a:solidFill>
+                              <a:latin typeface="Cambria Math" panose="02040503050406030204" pitchFamily="18" charset="0"/>
+                            </a:rPr>
+                          </m:ctrlPr>
+                        </m:sSupPr>
+                        <m:e>
+                          <m:r>
+                            <a:rPr lang="en-US" altLang="zh-TW" sz="6001" i="1">
+                              <a:solidFill>
+                                <a:srgbClr val="FBF1C7"/>
+                              </a:solidFill>
+                              <a:latin typeface="Cambria Math" panose="02040503050406030204" pitchFamily="18" charset="0"/>
+                            </a:rPr>
+                            <m:t>10000</m:t>
+                          </m:r>
+                        </m:e>
+                        <m:sup>
+                          <m:r>
+                            <a:rPr lang="en-US" altLang="zh-TW" sz="6001" b="0" i="1" smtClean="0">
+                              <a:solidFill>
+                                <a:srgbClr val="FBF1C7"/>
+                              </a:solidFill>
+                              <a:latin typeface="Cambria Math" panose="02040503050406030204" pitchFamily="18" charset="0"/>
+                            </a:rPr>
+                            <m:t>2</m:t>
+                          </m:r>
+                          <m:r>
+                            <a:rPr lang="en-US" altLang="zh-TW" sz="6001" b="0" i="1" smtClean="0">
+                              <a:solidFill>
+                                <a:srgbClr val="FBF1C7"/>
+                              </a:solidFill>
+                              <a:latin typeface="Cambria Math" panose="02040503050406030204" pitchFamily="18" charset="0"/>
+                            </a:rPr>
+                            <m:t>𝑖</m:t>
+                          </m:r>
+                          <m:r>
+                            <a:rPr lang="en-US" altLang="zh-TW" sz="6001" b="0" i="1" smtClean="0">
+                              <a:solidFill>
+                                <a:srgbClr val="FBF1C7"/>
+                              </a:solidFill>
+                              <a:latin typeface="Cambria Math" panose="02040503050406030204" pitchFamily="18" charset="0"/>
+                            </a:rPr>
+                            <m:t>/</m:t>
+                          </m:r>
+                          <m:sSub>
+                            <m:sSubPr>
+                              <m:ctrlPr>
+                                <a:rPr lang="en-US" altLang="zh-TW" sz="6001" b="0" i="1" smtClean="0">
+                                  <a:solidFill>
+                                    <a:srgbClr val="FBF1C7"/>
+                                  </a:solidFill>
+                                  <a:latin typeface="Cambria Math" panose="02040503050406030204" pitchFamily="18" charset="0"/>
+                                </a:rPr>
+                              </m:ctrlPr>
+                            </m:sSubPr>
+                            <m:e>
+                              <m:r>
+                                <a:rPr lang="en-US" altLang="zh-TW" sz="6001" b="0" i="1" smtClean="0">
+                                  <a:solidFill>
+                                    <a:srgbClr val="FBF1C7"/>
+                                  </a:solidFill>
+                                  <a:latin typeface="Cambria Math" panose="02040503050406030204" pitchFamily="18" charset="0"/>
+                                </a:rPr>
+                                <m:t>𝑑</m:t>
+                              </m:r>
+                            </m:e>
+                            <m:sub>
+                              <m:r>
+                                <a:rPr lang="en-US" altLang="zh-TW" sz="6001" b="0" i="1" smtClean="0">
+                                  <a:solidFill>
+                                    <a:srgbClr val="FBF1C7"/>
+                                  </a:solidFill>
+                                  <a:latin typeface="Cambria Math" panose="02040503050406030204" pitchFamily="18" charset="0"/>
+                                </a:rPr>
+                                <m:t>𝑒𝑚𝑏𝑒𝑑𝑑𝑖𝑛𝑔</m:t>
+                              </m:r>
+                            </m:sub>
+                          </m:sSub>
+                        </m:sup>
+                      </m:sSup>
+                      <m:r>
+                        <a:rPr lang="en-US" altLang="zh-TW" sz="6001" b="0" i="1" smtClean="0">
+                          <a:solidFill>
+                            <a:srgbClr val="FBF1C7"/>
+                          </a:solidFill>
+                          <a:latin typeface="Cambria Math" panose="02040503050406030204" pitchFamily="18" charset="0"/>
+                        </a:rPr>
+                        <m:t>)</m:t>
+                      </m:r>
+                    </m:oMath>
+                  </m:oMathPara>
+                </a14:m>
+                <a:endParaRPr lang="zh-TW" altLang="en-US" sz="6001" dirty="0">
+                  <a:solidFill>
+                    <a:srgbClr val="FBF1C7"/>
+                  </a:solidFill>
+                </a:endParaRPr>
+              </a:p>
+            </p:txBody>
+          </p:sp>
+        </mc:Choice>
+        <mc:Fallback>
+          <p:sp>
+            <p:nvSpPr>
+              <p:cNvPr id="4" name="文字方塊 3"/>
+              <p:cNvSpPr txBox="1">
+                <a:spLocks noRot="1" noChangeAspect="1" noMove="1" noResize="1" noEditPoints="1" noAdjustHandles="1" noChangeArrowheads="1" noChangeShapeType="1" noTextEdit="1"/>
+              </p:cNvSpPr>
+              <p:nvPr/>
+            </p:nvSpPr>
+            <p:spPr>
+              <a:xfrm>
+                <a:off x="3948545" y="1259535"/>
+                <a:ext cx="13868400" cy="986809"/>
+              </a:xfrm>
+              <a:prstGeom prst="rect">
+                <a:avLst/>
+              </a:prstGeom>
+              <a:blipFill rotWithShape="0">
+                <a:blip r:embed="rId2"/>
+                <a:stretch>
+                  <a:fillRect/>
+                </a:stretch>
+              </a:blipFill>
+            </p:spPr>
+            <p:txBody>
+              <a:bodyPr/>
+              <a:lstStyle/>
+              <a:p>
+                <a:r>
+                  <a:rPr lang="zh-TW" altLang="en-US">
+                    <a:noFill/>
+                  </a:rPr>
+                  <a:t> </a:t>
+                </a:r>
+              </a:p>
+            </p:txBody>
+          </p:sp>
+        </mc:Fallback>
+      </mc:AlternateContent>
+      <mc:AlternateContent xmlns:mc="http://schemas.openxmlformats.org/markup-compatibility/2006">
+        <mc:Choice xmlns:a14="http://schemas.microsoft.com/office/drawing/2010/main" Requires="a14">
+          <p:sp>
+            <p:nvSpPr>
+              <p:cNvPr id="3" name="文字方塊 2"/>
+              <p:cNvSpPr txBox="1"/>
+              <p:nvPr/>
+            </p:nvSpPr>
+            <p:spPr>
+              <a:xfrm>
+                <a:off x="3948545" y="2246344"/>
+                <a:ext cx="16029710" cy="986809"/>
+              </a:xfrm>
+              <a:prstGeom prst="rect">
+                <a:avLst/>
+              </a:prstGeom>
+              <a:noFill/>
+            </p:spPr>
+            <p:txBody>
+              <a:bodyPr wrap="square" lIns="0" tIns="0" rIns="0" bIns="0" rtlCol="0">
+                <a:spAutoFit/>
+              </a:bodyPr>
+              <a:lstStyle/>
+              <a:p>
+                <a:pPr/>
+                <a14:m>
+                  <m:oMathPara xmlns:m="http://schemas.openxmlformats.org/officeDocument/2006/math">
+                    <m:oMathParaPr>
+                      <m:jc m:val="centerGroup"/>
+                    </m:oMathParaPr>
+                    <m:oMath xmlns:m="http://schemas.openxmlformats.org/officeDocument/2006/math">
+                      <m:r>
+                        <m:rPr>
+                          <m:sty m:val="p"/>
+                        </m:rPr>
+                        <a:rPr lang="en-US" altLang="zh-TW" sz="6001" i="1" smtClean="0">
+                          <a:solidFill>
+                            <a:srgbClr val="FBF1C7"/>
+                          </a:solidFill>
+                          <a:latin typeface="Cambria Math" panose="02040503050406030204" pitchFamily="18" charset="0"/>
+                        </a:rPr>
+                        <m:t>P</m:t>
+                      </m:r>
+                      <m:r>
+                        <m:rPr>
+                          <m:sty m:val="p"/>
+                        </m:rPr>
+                        <a:rPr lang="en-US" altLang="zh-TW" sz="6001" i="1">
+                          <a:solidFill>
+                            <a:srgbClr val="FBF1C7"/>
+                          </a:solidFill>
+                          <a:latin typeface="Cambria Math" panose="02040503050406030204" pitchFamily="18" charset="0"/>
+                        </a:rPr>
+                        <m:t>E</m:t>
+                      </m:r>
+                      <m:r>
+                        <a:rPr lang="en-US" altLang="zh-TW" sz="6001" i="1">
+                          <a:solidFill>
+                            <a:srgbClr val="FBF1C7"/>
+                          </a:solidFill>
+                          <a:latin typeface="Cambria Math" panose="02040503050406030204" pitchFamily="18" charset="0"/>
+                        </a:rPr>
+                        <m:t>[</m:t>
+                      </m:r>
+                      <m:r>
+                        <a:rPr lang="en-US" altLang="zh-TW" sz="6001" b="0" i="1" smtClean="0">
+                          <a:solidFill>
+                            <a:srgbClr val="FBF1C7"/>
+                          </a:solidFill>
+                          <a:latin typeface="Cambria Math" panose="02040503050406030204" pitchFamily="18" charset="0"/>
+                        </a:rPr>
+                        <m:t>𝑝𝑜𝑠</m:t>
+                      </m:r>
+                      <m:r>
+                        <a:rPr lang="en-US" altLang="zh-TW" sz="6001" b="0" i="1" smtClean="0">
+                          <a:solidFill>
+                            <a:srgbClr val="FBF1C7"/>
+                          </a:solidFill>
+                          <a:latin typeface="Cambria Math" panose="02040503050406030204" pitchFamily="18" charset="0"/>
+                        </a:rPr>
+                        <m:t>,2</m:t>
+                      </m:r>
+                      <m:r>
+                        <a:rPr lang="en-US" altLang="zh-TW" sz="6001" b="0" i="1" smtClean="0">
+                          <a:solidFill>
+                            <a:srgbClr val="FBF1C7"/>
+                          </a:solidFill>
+                          <a:latin typeface="Cambria Math" panose="02040503050406030204" pitchFamily="18" charset="0"/>
+                        </a:rPr>
+                        <m:t>𝑖</m:t>
+                      </m:r>
+                      <m:r>
+                        <a:rPr lang="en-US" altLang="zh-TW" sz="6001" b="0" i="1" smtClean="0">
+                          <a:solidFill>
+                            <a:srgbClr val="FBF1C7"/>
+                          </a:solidFill>
+                          <a:latin typeface="Cambria Math" panose="02040503050406030204" pitchFamily="18" charset="0"/>
+                        </a:rPr>
+                        <m:t>+1]=</m:t>
+                      </m:r>
+                      <m:r>
+                        <m:rPr>
+                          <m:sty m:val="p"/>
+                        </m:rPr>
+                        <a:rPr lang="en-US" altLang="zh-TW" sz="6001" b="0" i="0" smtClean="0">
+                          <a:solidFill>
+                            <a:srgbClr val="FBF1C7"/>
+                          </a:solidFill>
+                          <a:latin typeface="Cambria Math" panose="02040503050406030204" pitchFamily="18" charset="0"/>
+                        </a:rPr>
+                        <m:t>cos</m:t>
+                      </m:r>
+                      <m:r>
+                        <a:rPr lang="en-US" altLang="zh-TW" sz="6001" b="0" i="1" smtClean="0">
+                          <a:solidFill>
+                            <a:srgbClr val="FBF1C7"/>
+                          </a:solidFill>
+                          <a:latin typeface="Cambria Math" panose="02040503050406030204" pitchFamily="18" charset="0"/>
+                        </a:rPr>
+                        <m:t>⁡(</m:t>
+                      </m:r>
+                      <m:r>
+                        <a:rPr lang="en-US" altLang="zh-TW" sz="6001" b="0" i="1" smtClean="0">
+                          <a:solidFill>
+                            <a:srgbClr val="FBF1C7"/>
+                          </a:solidFill>
+                          <a:latin typeface="Cambria Math" panose="02040503050406030204" pitchFamily="18" charset="0"/>
+                        </a:rPr>
+                        <m:t>𝑝𝑜𝑠</m:t>
+                      </m:r>
+                      <m:r>
+                        <a:rPr lang="en-US" altLang="zh-TW" sz="6001" b="0" i="1" smtClean="0">
+                          <a:solidFill>
+                            <a:srgbClr val="FBF1C7"/>
+                          </a:solidFill>
+                          <a:latin typeface="Cambria Math" panose="02040503050406030204" pitchFamily="18" charset="0"/>
+                        </a:rPr>
+                        <m:t>/</m:t>
+                      </m:r>
+                      <m:sSup>
+                        <m:sSupPr>
+                          <m:ctrlPr>
+                            <a:rPr lang="en-US" altLang="zh-TW" sz="6001" b="0" i="1" smtClean="0">
+                              <a:solidFill>
+                                <a:srgbClr val="FBF1C7"/>
+                              </a:solidFill>
+                              <a:latin typeface="Cambria Math" panose="02040503050406030204" pitchFamily="18" charset="0"/>
+                            </a:rPr>
+                          </m:ctrlPr>
+                        </m:sSupPr>
+                        <m:e>
+                          <m:r>
+                            <a:rPr lang="en-US" altLang="zh-TW" sz="6001" i="1">
+                              <a:solidFill>
+                                <a:srgbClr val="FBF1C7"/>
+                              </a:solidFill>
+                              <a:latin typeface="Cambria Math" panose="02040503050406030204" pitchFamily="18" charset="0"/>
+                            </a:rPr>
+                            <m:t>10000</m:t>
+                          </m:r>
+                        </m:e>
+                        <m:sup>
+                          <m:r>
+                            <a:rPr lang="en-US" altLang="zh-TW" sz="6001" i="1">
+                              <a:solidFill>
+                                <a:srgbClr val="FBF1C7"/>
+                              </a:solidFill>
+                              <a:latin typeface="Cambria Math" panose="02040503050406030204" pitchFamily="18" charset="0"/>
+                            </a:rPr>
+                            <m:t>2</m:t>
+                          </m:r>
+                          <m:r>
+                            <a:rPr lang="en-US" altLang="zh-TW" sz="6001" i="1">
+                              <a:solidFill>
+                                <a:srgbClr val="FBF1C7"/>
+                              </a:solidFill>
+                              <a:latin typeface="Cambria Math" panose="02040503050406030204" pitchFamily="18" charset="0"/>
+                            </a:rPr>
+                            <m:t>𝑖</m:t>
+                          </m:r>
+                          <m:r>
+                            <a:rPr lang="en-US" altLang="zh-TW" sz="6001" i="1">
+                              <a:solidFill>
+                                <a:srgbClr val="FBF1C7"/>
+                              </a:solidFill>
+                              <a:latin typeface="Cambria Math" panose="02040503050406030204" pitchFamily="18" charset="0"/>
+                            </a:rPr>
+                            <m:t>+1/</m:t>
+                          </m:r>
+                          <m:sSub>
+                            <m:sSubPr>
+                              <m:ctrlPr>
+                                <a:rPr lang="en-US" altLang="zh-TW" sz="6001" i="1">
+                                  <a:solidFill>
+                                    <a:srgbClr val="FBF1C7"/>
+                                  </a:solidFill>
+                                  <a:latin typeface="Cambria Math" panose="02040503050406030204" pitchFamily="18" charset="0"/>
+                                </a:rPr>
+                              </m:ctrlPr>
+                            </m:sSubPr>
+                            <m:e>
+                              <m:r>
+                                <a:rPr lang="en-US" altLang="zh-TW" sz="6001" i="1">
+                                  <a:solidFill>
+                                    <a:srgbClr val="FBF1C7"/>
+                                  </a:solidFill>
+                                  <a:latin typeface="Cambria Math" panose="02040503050406030204" pitchFamily="18" charset="0"/>
+                                </a:rPr>
+                                <m:t>𝑑</m:t>
+                              </m:r>
+                            </m:e>
+                            <m:sub>
+                              <m:r>
+                                <a:rPr lang="en-US" altLang="zh-TW" sz="6001" i="1">
+                                  <a:solidFill>
+                                    <a:srgbClr val="FBF1C7"/>
+                                  </a:solidFill>
+                                  <a:latin typeface="Cambria Math" panose="02040503050406030204" pitchFamily="18" charset="0"/>
+                                </a:rPr>
+                                <m:t>𝑒𝑚𝑏𝑒𝑑𝑑𝑖𝑛𝑔</m:t>
+                              </m:r>
+                            </m:sub>
+                          </m:sSub>
+                        </m:sup>
+                      </m:sSup>
+                      <m:r>
+                        <a:rPr lang="en-US" altLang="zh-TW" sz="6001" b="0" i="1" smtClean="0">
+                          <a:solidFill>
+                            <a:srgbClr val="FBF1C7"/>
+                          </a:solidFill>
+                          <a:latin typeface="Cambria Math" panose="02040503050406030204" pitchFamily="18" charset="0"/>
+                        </a:rPr>
+                        <m:t>)</m:t>
+                      </m:r>
+                    </m:oMath>
+                  </m:oMathPara>
+                </a14:m>
+                <a:endParaRPr lang="zh-TW" altLang="en-US" sz="6001" dirty="0">
+                  <a:solidFill>
+                    <a:srgbClr val="FBF1C7"/>
+                  </a:solidFill>
+                </a:endParaRPr>
+              </a:p>
+            </p:txBody>
+          </p:sp>
+        </mc:Choice>
+        <mc:Fallback>
+          <p:sp>
+            <p:nvSpPr>
+              <p:cNvPr id="3" name="文字方塊 2"/>
+              <p:cNvSpPr txBox="1">
+                <a:spLocks noRot="1" noChangeAspect="1" noMove="1" noResize="1" noEditPoints="1" noAdjustHandles="1" noChangeArrowheads="1" noChangeShapeType="1" noTextEdit="1"/>
+              </p:cNvSpPr>
+              <p:nvPr/>
+            </p:nvSpPr>
+            <p:spPr>
+              <a:xfrm>
+                <a:off x="3948545" y="2246344"/>
+                <a:ext cx="16029710" cy="986809"/>
+              </a:xfrm>
+              <a:prstGeom prst="rect">
+                <a:avLst/>
+              </a:prstGeom>
+              <a:blipFill rotWithShape="0">
+                <a:blip r:embed="rId3"/>
+                <a:stretch>
+                  <a:fillRect/>
+                </a:stretch>
+              </a:blipFill>
+            </p:spPr>
+            <p:txBody>
+              <a:bodyPr/>
+              <a:lstStyle/>
+              <a:p>
+                <a:r>
+                  <a:rPr lang="zh-TW" altLang="en-US">
+                    <a:noFill/>
+                  </a:rPr>
+                  <a:t> </a:t>
+                </a:r>
+              </a:p>
+            </p:txBody>
+          </p:sp>
+        </mc:Fallback>
+      </mc:AlternateContent>
+    </p:spTree>
+    <p:extLst>
+      <p:ext uri="{BB962C8B-B14F-4D97-AF65-F5344CB8AC3E}">
+        <p14:creationId xmlns:p14="http://schemas.microsoft.com/office/powerpoint/2010/main" val="2699760992"/>
       </p:ext>
     </p:extLst>
   </p:cSld>

</xml_diff>